<commit_message>
Correct missing feature list
</commit_message>
<xml_diff>
--- a/dokumenty/PrezFin.pptx
+++ b/dokumenty/PrezFin.pptx
@@ -258,7 +258,7 @@
           <a:p>
             <a:fld id="{48A87A34-81AB-432B-8DAE-1953F412C126}" type="datetimeFigureOut">
               <a:rPr lang="en-US" dirty="0"/>
-              <a:t>5/8/2022</a:t>
+              <a:t>5/9/2022</a:t>
             </a:fld>
             <a:endParaRPr lang="en-US" dirty="0"/>
           </a:p>
@@ -473,7 +473,7 @@
           <a:p>
             <a:fld id="{48A87A34-81AB-432B-8DAE-1953F412C126}" type="datetimeFigureOut">
               <a:rPr lang="en-US" dirty="0"/>
-              <a:t>5/8/2022</a:t>
+              <a:t>5/9/2022</a:t>
             </a:fld>
             <a:endParaRPr lang="en-US" dirty="0"/>
           </a:p>
@@ -692,7 +692,7 @@
           <a:p>
             <a:fld id="{48A87A34-81AB-432B-8DAE-1953F412C126}" type="datetimeFigureOut">
               <a:rPr lang="en-US" dirty="0"/>
-              <a:t>5/8/2022</a:t>
+              <a:t>5/9/2022</a:t>
             </a:fld>
             <a:endParaRPr lang="en-US" dirty="0"/>
           </a:p>
@@ -902,7 +902,7 @@
             <a:fld id="{48A87A34-81AB-432B-8DAE-1953F412C126}" type="datetimeFigureOut">
               <a:rPr lang="en-US" dirty="0"/>
               <a:pPr/>
-              <a:t>5/8/2022</a:t>
+              <a:t>5/9/2022</a:t>
             </a:fld>
             <a:endParaRPr lang="en-US" dirty="0"/>
           </a:p>
@@ -1189,7 +1189,7 @@
           <a:p>
             <a:fld id="{48A87A34-81AB-432B-8DAE-1953F412C126}" type="datetimeFigureOut">
               <a:rPr lang="en-US" dirty="0"/>
-              <a:t>5/8/2022</a:t>
+              <a:t>5/9/2022</a:t>
             </a:fld>
             <a:endParaRPr lang="en-US" dirty="0"/>
           </a:p>
@@ -1461,7 +1461,7 @@
           <a:p>
             <a:fld id="{48A87A34-81AB-432B-8DAE-1953F412C126}" type="datetimeFigureOut">
               <a:rPr lang="en-US" dirty="0"/>
-              <a:t>5/8/2022</a:t>
+              <a:t>5/9/2022</a:t>
             </a:fld>
             <a:endParaRPr lang="en-US" dirty="0"/>
           </a:p>
@@ -1881,7 +1881,7 @@
           <a:p>
             <a:fld id="{48A87A34-81AB-432B-8DAE-1953F412C126}" type="datetimeFigureOut">
               <a:rPr lang="en-US" dirty="0"/>
-              <a:t>5/8/2022</a:t>
+              <a:t>5/9/2022</a:t>
             </a:fld>
             <a:endParaRPr lang="en-US" dirty="0"/>
           </a:p>
@@ -2034,7 +2034,7 @@
           <a:p>
             <a:fld id="{48A87A34-81AB-432B-8DAE-1953F412C126}" type="datetimeFigureOut">
               <a:rPr lang="en-US" dirty="0"/>
-              <a:t>5/8/2022</a:t>
+              <a:t>5/9/2022</a:t>
             </a:fld>
             <a:endParaRPr lang="en-US" dirty="0"/>
           </a:p>
@@ -2164,7 +2164,7 @@
           <a:p>
             <a:fld id="{48A87A34-81AB-432B-8DAE-1953F412C126}" type="datetimeFigureOut">
               <a:rPr lang="en-US" dirty="0"/>
-              <a:t>5/8/2022</a:t>
+              <a:t>5/9/2022</a:t>
             </a:fld>
             <a:endParaRPr lang="en-US" dirty="0"/>
           </a:p>
@@ -2410,7 +2410,7 @@
           <a:p>
             <a:fld id="{48A87A34-81AB-432B-8DAE-1953F412C126}" type="datetimeFigureOut">
               <a:rPr lang="en-US" dirty="0"/>
-              <a:t>5/8/2022</a:t>
+              <a:t>5/9/2022</a:t>
             </a:fld>
             <a:endParaRPr lang="en-US" dirty="0"/>
           </a:p>
@@ -2866,7 +2866,7 @@
             <a:fld id="{48A87A34-81AB-432B-8DAE-1953F412C126}" type="datetimeFigureOut">
               <a:rPr lang="en-US" dirty="0"/>
               <a:pPr/>
-              <a:t>5/8/2022</a:t>
+              <a:t>5/9/2022</a:t>
             </a:fld>
             <a:endParaRPr lang="en-US" dirty="0"/>
           </a:p>
@@ -3244,7 +3244,7 @@
             <a:fld id="{48A87A34-81AB-432B-8DAE-1953F412C126}" type="datetimeFigureOut">
               <a:rPr lang="en-US" dirty="0"/>
               <a:pPr/>
-              <a:t>5/8/2022</a:t>
+              <a:t>5/9/2022</a:t>
             </a:fld>
             <a:endParaRPr lang="en-US" dirty="0"/>
           </a:p>
@@ -4140,6 +4140,29 @@
             </a:r>
             <a:endParaRPr lang="en-US" dirty="0"/>
           </a:p>
+          <a:p>
+            <a:r>
+              <a:rPr lang="en-US" dirty="0"/>
+              <a:t>Manu</a:t>
+            </a:r>
+            <a:r>
+              <a:rPr lang="sk-SK" dirty="0" err="1"/>
+              <a:t>álne</a:t>
+            </a:r>
+            <a:r>
+              <a:rPr lang="sk-SK" dirty="0"/>
+              <a:t> nastavenie </a:t>
+            </a:r>
+            <a:r>
+              <a:rPr lang="sk-SK" dirty="0" err="1"/>
+              <a:t>seen</a:t>
+            </a:r>
+            <a:r>
+              <a:rPr lang="sk-SK" dirty="0"/>
+              <a:t> update</a:t>
+            </a:r>
+            <a:endParaRPr lang="en-US" dirty="0"/>
+          </a:p>
         </p:txBody>
       </p:sp>
     </p:spTree>

</xml_diff>